<commit_message>
Processed issues after 1st training
</commit_message>
<xml_diff>
--- a/Powerpoint/Webinar.pptx
+++ b/Powerpoint/Webinar.pptx
@@ -216,7 +216,7 @@
           <a:p>
             <a:fld id="{EF7605A9-D843-407C-9CBE-B56DCAD297D7}" type="datetimeFigureOut">
               <a:rPr lang="en-US" smtClean="0"/>
-              <a:t>12-05-20</a:t>
+              <a:t>19-05-20</a:t>
             </a:fld>
             <a:endParaRPr lang="en-US"/>
           </a:p>
@@ -1005,7 +1005,7 @@
           <a:p>
             <a:fld id="{ACF7820E-34FD-4988-B782-4EA914680210}" type="datetimeFigureOut">
               <a:rPr lang="da-DK" smtClean="0"/>
-              <a:t>12-05-2020</a:t>
+              <a:t>19-05-2020</a:t>
             </a:fld>
             <a:endParaRPr lang="da-DK"/>
           </a:p>
@@ -1153,7 +1153,7 @@
           <a:p>
             <a:fld id="{ACF7820E-34FD-4988-B782-4EA914680210}" type="datetimeFigureOut">
               <a:rPr lang="da-DK" smtClean="0"/>
-              <a:t>12-05-2020</a:t>
+              <a:t>19-05-2020</a:t>
             </a:fld>
             <a:endParaRPr lang="da-DK"/>
           </a:p>
@@ -1278,7 +1278,7 @@
           <a:p>
             <a:fld id="{ACF7820E-34FD-4988-B782-4EA914680210}" type="datetimeFigureOut">
               <a:rPr lang="da-DK" smtClean="0"/>
-              <a:t>12-05-2020</a:t>
+              <a:t>19-05-2020</a:t>
             </a:fld>
             <a:endParaRPr lang="da-DK"/>
           </a:p>
@@ -1403,7 +1403,7 @@
           <a:p>
             <a:fld id="{ACF7820E-34FD-4988-B782-4EA914680210}" type="datetimeFigureOut">
               <a:rPr lang="da-DK" smtClean="0"/>
-              <a:t>12-05-2020</a:t>
+              <a:t>19-05-2020</a:t>
             </a:fld>
             <a:endParaRPr lang="da-DK"/>
           </a:p>
@@ -1717,7 +1717,7 @@
           <a:p>
             <a:fld id="{ACF7820E-34FD-4988-B782-4EA914680210}" type="datetimeFigureOut">
               <a:rPr lang="da-DK" smtClean="0"/>
-              <a:t>12-05-2020</a:t>
+              <a:t>19-05-2020</a:t>
             </a:fld>
             <a:endParaRPr lang="da-DK"/>
           </a:p>
@@ -2031,7 +2031,7 @@
           <a:p>
             <a:fld id="{ACF7820E-34FD-4988-B782-4EA914680210}" type="datetimeFigureOut">
               <a:rPr lang="da-DK" smtClean="0"/>
-              <a:t>12-05-2020</a:t>
+              <a:t>19-05-2020</a:t>
             </a:fld>
             <a:endParaRPr lang="da-DK"/>
           </a:p>
@@ -2314,7 +2314,7 @@
           <a:p>
             <a:fld id="{ACF7820E-34FD-4988-B782-4EA914680210}" type="datetimeFigureOut">
               <a:rPr lang="da-DK" smtClean="0"/>
-              <a:t>12-05-2020</a:t>
+              <a:t>19-05-2020</a:t>
             </a:fld>
             <a:endParaRPr lang="da-DK"/>
           </a:p>
@@ -2597,7 +2597,7 @@
           <a:p>
             <a:fld id="{ACF7820E-34FD-4988-B782-4EA914680210}" type="datetimeFigureOut">
               <a:rPr lang="da-DK" smtClean="0"/>
-              <a:t>12-05-2020</a:t>
+              <a:t>19-05-2020</a:t>
             </a:fld>
             <a:endParaRPr lang="da-DK"/>
           </a:p>
@@ -2802,7 +2802,7 @@
           <a:p>
             <a:fld id="{ACF7820E-34FD-4988-B782-4EA914680210}" type="datetimeFigureOut">
               <a:rPr lang="da-DK" smtClean="0"/>
-              <a:t>12-05-2020</a:t>
+              <a:t>19-05-2020</a:t>
             </a:fld>
             <a:endParaRPr lang="da-DK"/>
           </a:p>
@@ -3007,7 +3007,7 @@
           <a:p>
             <a:fld id="{ACF7820E-34FD-4988-B782-4EA914680210}" type="datetimeFigureOut">
               <a:rPr lang="da-DK" smtClean="0"/>
-              <a:t>12-05-2020</a:t>
+              <a:t>19-05-2020</a:t>
             </a:fld>
             <a:endParaRPr lang="da-DK"/>
           </a:p>
@@ -3283,7 +3283,7 @@
           <a:p>
             <a:fld id="{ACF7820E-34FD-4988-B782-4EA914680210}" type="datetimeFigureOut">
               <a:rPr lang="da-DK" smtClean="0"/>
-              <a:t>12-05-2020</a:t>
+              <a:t>19-05-2020</a:t>
             </a:fld>
             <a:endParaRPr lang="da-DK"/>
           </a:p>
@@ -3515,7 +3515,7 @@
           <a:p>
             <a:fld id="{ACF7820E-34FD-4988-B782-4EA914680210}" type="datetimeFigureOut">
               <a:rPr lang="da-DK" smtClean="0"/>
-              <a:t>12-05-2020</a:t>
+              <a:t>19-05-2020</a:t>
             </a:fld>
             <a:endParaRPr lang="da-DK"/>
           </a:p>
@@ -3777,7 +3777,7 @@
           <a:p>
             <a:fld id="{ACF7820E-34FD-4988-B782-4EA914680210}" type="datetimeFigureOut">
               <a:rPr lang="da-DK" smtClean="0"/>
-              <a:t>12-05-2020</a:t>
+              <a:t>19-05-2020</a:t>
             </a:fld>
             <a:endParaRPr lang="da-DK"/>
           </a:p>
@@ -4190,7 +4190,7 @@
           <a:p>
             <a:fld id="{ACF7820E-34FD-4988-B782-4EA914680210}" type="datetimeFigureOut">
               <a:rPr lang="da-DK" smtClean="0"/>
-              <a:t>12-05-2020</a:t>
+              <a:t>19-05-2020</a:t>
             </a:fld>
             <a:endParaRPr lang="da-DK"/>
           </a:p>
@@ -4603,7 +4603,7 @@
           <a:p>
             <a:fld id="{ACF7820E-34FD-4988-B782-4EA914680210}" type="datetimeFigureOut">
               <a:rPr lang="da-DK" smtClean="0"/>
-              <a:t>12-05-2020</a:t>
+              <a:t>19-05-2020</a:t>
             </a:fld>
             <a:endParaRPr lang="da-DK"/>
           </a:p>
@@ -4751,7 +4751,7 @@
           <a:p>
             <a:fld id="{ACF7820E-34FD-4988-B782-4EA914680210}" type="datetimeFigureOut">
               <a:rPr lang="da-DK" smtClean="0"/>
-              <a:t>12-05-2020</a:t>
+              <a:t>19-05-2020</a:t>
             </a:fld>
             <a:endParaRPr lang="da-DK"/>
           </a:p>
@@ -4994,7 +4994,7 @@
           <a:p>
             <a:fld id="{ACF7820E-34FD-4988-B782-4EA914680210}" type="datetimeFigureOut">
               <a:rPr lang="da-DK" smtClean="0"/>
-              <a:t>12-05-2020</a:t>
+              <a:t>19-05-2020</a:t>
             </a:fld>
             <a:endParaRPr lang="da-DK"/>
           </a:p>
@@ -6364,7 +6364,7 @@
         <p:spPr>
           <a:xfrm>
             <a:off x="536294" y="1582340"/>
-            <a:ext cx="4892233" cy="3139321"/>
+            <a:ext cx="4892233" cy="2585323"/>
           </a:xfrm>
           <a:prstGeom prst="rect">
             <a:avLst/>
@@ -6403,16 +6403,11 @@
               <a:rPr lang="en-US" dirty="0"/>
               <a:t>- Designer deep dive</a:t>
             </a:r>
-          </a:p>
-          <a:p>
-            <a:r>
-              <a:rPr lang="en-US" dirty="0">
-                <a:solidFill>
-                  <a:srgbClr val="E64215"/>
-                </a:solidFill>
-              </a:rPr>
-              <a:t>Session 2</a:t>
-            </a:r>
+            <a:endParaRPr lang="en-US" dirty="0">
+              <a:solidFill>
+                <a:srgbClr val="E64215"/>
+              </a:solidFill>
+            </a:endParaRPr>
           </a:p>
           <a:p>
             <a:r>
@@ -6425,16 +6420,11 @@
               <a:rPr lang="en-US" dirty="0"/>
               <a:t>- Templates</a:t>
             </a:r>
-          </a:p>
-          <a:p>
-            <a:r>
-              <a:rPr lang="en-US" dirty="0">
-                <a:solidFill>
-                  <a:srgbClr val="E64215"/>
-                </a:solidFill>
-              </a:rPr>
-              <a:t>Session 3</a:t>
-            </a:r>
+            <a:endParaRPr lang="en-US" dirty="0">
+              <a:solidFill>
+                <a:srgbClr val="E64215"/>
+              </a:solidFill>
+            </a:endParaRPr>
           </a:p>
           <a:p>
             <a:r>
@@ -6472,7 +6462,7 @@
         <p:spPr>
           <a:xfrm>
             <a:off x="5730433" y="1690688"/>
-            <a:ext cx="4892233" cy="2862322"/>
+            <a:ext cx="4892233" cy="2585323"/>
           </a:xfrm>
           <a:prstGeom prst="rect">
             <a:avLst/>
@@ -6491,7 +6481,7 @@
                   <a:srgbClr val="E64215"/>
                 </a:solidFill>
               </a:rPr>
-              <a:t>Session 4</a:t>
+              <a:t>Session 2</a:t>
             </a:r>
           </a:p>
           <a:p>
@@ -6505,6 +6495,45 @@
               <a:rPr lang="en-US" dirty="0"/>
               <a:t>- Totals and transheaders and -footers</a:t>
             </a:r>
+            <a:endParaRPr lang="en-US" dirty="0">
+              <a:solidFill>
+                <a:srgbClr val="E64215"/>
+              </a:solidFill>
+            </a:endParaRPr>
+          </a:p>
+          <a:p>
+            <a:r>
+              <a:rPr lang="en-US" dirty="0"/>
+              <a:t>- Add DataItems</a:t>
+            </a:r>
+          </a:p>
+          <a:p>
+            <a:r>
+              <a:rPr lang="en-US" dirty="0"/>
+              <a:t>- </a:t>
+            </a:r>
+            <a:r>
+              <a:rPr lang="en-US" dirty="0" err="1"/>
+              <a:t>Groupheaders</a:t>
+            </a:r>
+            <a:r>
+              <a:rPr lang="en-US" dirty="0"/>
+              <a:t> and -footers</a:t>
+            </a:r>
+            <a:endParaRPr lang="en-US" dirty="0">
+              <a:solidFill>
+                <a:srgbClr val="E64215"/>
+              </a:solidFill>
+            </a:endParaRPr>
+          </a:p>
+          <a:p>
+            <a:r>
+              <a:rPr lang="en-US" dirty="0"/>
+              <a:t>- Create new reports</a:t>
+            </a:r>
+          </a:p>
+          <a:p>
+            <a:endParaRPr lang="en-US" dirty="0"/>
           </a:p>
           <a:p>
             <a:r>
@@ -6513,53 +6542,7 @@
                   <a:srgbClr val="E64215"/>
                 </a:solidFill>
               </a:rPr>
-              <a:t>Session 5</a:t>
-            </a:r>
-          </a:p>
-          <a:p>
-            <a:r>
-              <a:rPr lang="en-US" dirty="0"/>
-              <a:t>- Add DataItems</a:t>
-            </a:r>
-          </a:p>
-          <a:p>
-            <a:r>
-              <a:rPr lang="en-US" dirty="0"/>
-              <a:t>- </a:t>
-            </a:r>
-            <a:r>
-              <a:rPr lang="en-US" dirty="0" err="1"/>
-              <a:t>Groupheaders</a:t>
-            </a:r>
-            <a:r>
-              <a:rPr lang="en-US" dirty="0"/>
-              <a:t> and -footers</a:t>
-            </a:r>
-          </a:p>
-          <a:p>
-            <a:r>
-              <a:rPr lang="en-US" dirty="0">
-                <a:solidFill>
-                  <a:srgbClr val="E64215"/>
-                </a:solidFill>
-              </a:rPr>
-              <a:t>Session 6</a:t>
-            </a:r>
-          </a:p>
-          <a:p>
-            <a:r>
-              <a:rPr lang="en-US" dirty="0"/>
-              <a:t>- Create new reports</a:t>
-            </a:r>
-          </a:p>
-          <a:p>
-            <a:r>
-              <a:rPr lang="en-US" dirty="0">
-                <a:solidFill>
-                  <a:srgbClr val="E64215"/>
-                </a:solidFill>
-              </a:rPr>
-              <a:t>Session 7</a:t>
+              <a:t>Session 3</a:t>
             </a:r>
           </a:p>
           <a:p>

</xml_diff>